<commit_message>
updated ppt to reflect new class #
</commit_message>
<xml_diff>
--- a/Week02/ClassesIntro.pptx
+++ b/Week02/ClassesIntro.pptx
@@ -206,7 +206,7 @@
           <a:p>
             <a:fld id="{60C6A8C3-8392-4BC1-B99F-0D6991348B0F}" type="datetimeFigureOut">
               <a:rPr lang="en-US" smtClean="0"/>
-              <a:t>1/25/2019</a:t>
+              <a:t>10/2/2019</a:t>
             </a:fld>
             <a:endParaRPr lang="en-US"/>
           </a:p>
@@ -1367,7 +1367,7 @@
           <a:p>
             <a:fld id="{61FD5E12-641C-4696-BA65-B86205845F69}" type="datetimeFigureOut">
               <a:rPr lang="en-US" smtClean="0"/>
-              <a:t>1/25/2019</a:t>
+              <a:t>10/2/2019</a:t>
             </a:fld>
             <a:endParaRPr lang="en-US"/>
           </a:p>
@@ -1537,7 +1537,7 @@
           <a:p>
             <a:fld id="{61FD5E12-641C-4696-BA65-B86205845F69}" type="datetimeFigureOut">
               <a:rPr lang="en-US" smtClean="0"/>
-              <a:t>1/25/2019</a:t>
+              <a:t>10/2/2019</a:t>
             </a:fld>
             <a:endParaRPr lang="en-US"/>
           </a:p>
@@ -1717,7 +1717,7 @@
           <a:p>
             <a:fld id="{61FD5E12-641C-4696-BA65-B86205845F69}" type="datetimeFigureOut">
               <a:rPr lang="en-US" smtClean="0"/>
-              <a:t>1/25/2019</a:t>
+              <a:t>10/2/2019</a:t>
             </a:fld>
             <a:endParaRPr lang="en-US"/>
           </a:p>
@@ -2517,7 +2517,7 @@
           <a:p>
             <a:fld id="{61FD5E12-641C-4696-BA65-B86205845F69}" type="datetimeFigureOut">
               <a:rPr lang="en-US" smtClean="0"/>
-              <a:t>1/25/2019</a:t>
+              <a:t>10/2/2019</a:t>
             </a:fld>
             <a:endParaRPr lang="en-US"/>
           </a:p>
@@ -2763,7 +2763,7 @@
           <a:p>
             <a:fld id="{61FD5E12-641C-4696-BA65-B86205845F69}" type="datetimeFigureOut">
               <a:rPr lang="en-US" smtClean="0"/>
-              <a:t>1/25/2019</a:t>
+              <a:t>10/2/2019</a:t>
             </a:fld>
             <a:endParaRPr lang="en-US"/>
           </a:p>
@@ -2995,7 +2995,7 @@
           <a:p>
             <a:fld id="{61FD5E12-641C-4696-BA65-B86205845F69}" type="datetimeFigureOut">
               <a:rPr lang="en-US" smtClean="0"/>
-              <a:t>1/25/2019</a:t>
+              <a:t>10/2/2019</a:t>
             </a:fld>
             <a:endParaRPr lang="en-US"/>
           </a:p>
@@ -3362,7 +3362,7 @@
           <a:p>
             <a:fld id="{61FD5E12-641C-4696-BA65-B86205845F69}" type="datetimeFigureOut">
               <a:rPr lang="en-US" smtClean="0"/>
-              <a:t>1/25/2019</a:t>
+              <a:t>10/2/2019</a:t>
             </a:fld>
             <a:endParaRPr lang="en-US"/>
           </a:p>
@@ -3480,7 +3480,7 @@
           <a:p>
             <a:fld id="{61FD5E12-641C-4696-BA65-B86205845F69}" type="datetimeFigureOut">
               <a:rPr lang="en-US" smtClean="0"/>
-              <a:t>1/25/2019</a:t>
+              <a:t>10/2/2019</a:t>
             </a:fld>
             <a:endParaRPr lang="en-US"/>
           </a:p>
@@ -3575,7 +3575,7 @@
           <a:p>
             <a:fld id="{61FD5E12-641C-4696-BA65-B86205845F69}" type="datetimeFigureOut">
               <a:rPr lang="en-US" smtClean="0"/>
-              <a:t>1/25/2019</a:t>
+              <a:t>10/2/2019</a:t>
             </a:fld>
             <a:endParaRPr lang="en-US"/>
           </a:p>
@@ -3852,7 +3852,7 @@
           <a:p>
             <a:fld id="{61FD5E12-641C-4696-BA65-B86205845F69}" type="datetimeFigureOut">
               <a:rPr lang="en-US" smtClean="0"/>
-              <a:t>1/25/2019</a:t>
+              <a:t>10/2/2019</a:t>
             </a:fld>
             <a:endParaRPr lang="en-US"/>
           </a:p>
@@ -4109,7 +4109,7 @@
           <a:p>
             <a:fld id="{61FD5E12-641C-4696-BA65-B86205845F69}" type="datetimeFigureOut">
               <a:rPr lang="en-US" smtClean="0"/>
-              <a:t>1/25/2019</a:t>
+              <a:t>10/2/2019</a:t>
             </a:fld>
             <a:endParaRPr lang="en-US"/>
           </a:p>
@@ -4322,7 +4322,7 @@
           <a:p>
             <a:fld id="{61FD5E12-641C-4696-BA65-B86205845F69}" type="datetimeFigureOut">
               <a:rPr lang="en-US" smtClean="0"/>
-              <a:t>1/25/2019</a:t>
+              <a:t>10/2/2019</a:t>
             </a:fld>
             <a:endParaRPr lang="en-US"/>
           </a:p>
@@ -4752,7 +4752,15 @@
           <a:p>
             <a:r>
               <a:rPr lang="en-US" dirty="0" smtClean="0"/>
-              <a:t>C# 101: Classes</a:t>
+              <a:t>C# </a:t>
+            </a:r>
+            <a:r>
+              <a:rPr lang="en-US" dirty="0" smtClean="0"/>
+              <a:t>102: </a:t>
+            </a:r>
+            <a:r>
+              <a:rPr lang="en-US" dirty="0" smtClean="0"/>
+              <a:t>Classes</a:t>
             </a:r>
             <a:endParaRPr lang="en-US" dirty="0"/>
           </a:p>

</xml_diff>